<commit_message>
updated presentation with d3 chart image
</commit_message>
<xml_diff>
--- a/presentations/kh_mb_presentation.pptx
+++ b/presentations/kh_mb_presentation.pptx
@@ -1090,12 +1090,12 @@
           </a:ln>
           <a:extLst>
             <a:ext uri="{909E8E84-426E-40dd-AFC4-6F175D3DCCD1}">
-              <a14:hiddenFill xmlns:a14="http://schemas.microsoft.com/office/drawing/2010/main" xmlns="">
+              <a14:hiddenFill xmlns="" xmlns:a14="http://schemas.microsoft.com/office/drawing/2010/main">
                 <a:noFill/>
               </a14:hiddenFill>
             </a:ext>
             <a:ext uri="{91240B29-F687-4f45-9708-019B960494DF}">
-              <a14:hiddenLine xmlns:a14="http://schemas.microsoft.com/office/drawing/2010/main" xmlns="" w="9525">
+              <a14:hiddenLine xmlns="" xmlns:a14="http://schemas.microsoft.com/office/drawing/2010/main" w="9525">
                 <a:solidFill>
                   <a:srgbClr val="000000"/>
                 </a:solidFill>
@@ -1140,12 +1140,12 @@
           </a:ln>
           <a:extLst>
             <a:ext uri="{909E8E84-426E-40dd-AFC4-6F175D3DCCD1}">
-              <a14:hiddenFill xmlns:a14="http://schemas.microsoft.com/office/drawing/2010/main" xmlns="">
+              <a14:hiddenFill xmlns="" xmlns:a14="http://schemas.microsoft.com/office/drawing/2010/main">
                 <a:noFill/>
               </a14:hiddenFill>
             </a:ext>
             <a:ext uri="{91240B29-F687-4f45-9708-019B960494DF}">
-              <a14:hiddenLine xmlns:a14="http://schemas.microsoft.com/office/drawing/2010/main" xmlns="" w="9525">
+              <a14:hiddenLine xmlns="" xmlns:a14="http://schemas.microsoft.com/office/drawing/2010/main" w="9525">
                 <a:solidFill>
                   <a:srgbClr val="000000"/>
                 </a:solidFill>
@@ -2171,7 +2171,7 @@
             <a:effectLst/>
             <a:extLst>
               <a:ext uri="{C572A759-6A51-4108-AA02-DFA0A04FC94B}">
-                <ma14:wrappingTextBoxFlag xmlns="" xmlns:ma14="http://schemas.microsoft.com/office/mac/drawingml/2011/main" val="1"/>
+                <ma14:wrappingTextBoxFlag xmlns:ma14="http://schemas.microsoft.com/office/mac/drawingml/2011/main" xmlns="" val="1"/>
               </a:ext>
             </a:extLst>
           </p:spPr>
@@ -2242,7 +2242,7 @@
             <a:effectLst/>
             <a:extLst>
               <a:ext uri="{C572A759-6A51-4108-AA02-DFA0A04FC94B}">
-                <ma14:wrappingTextBoxFlag xmlns="" xmlns:ma14="http://schemas.microsoft.com/office/mac/drawingml/2011/main" val="1"/>
+                <ma14:wrappingTextBoxFlag xmlns:ma14="http://schemas.microsoft.com/office/mac/drawingml/2011/main" xmlns="" val="1"/>
               </a:ext>
             </a:extLst>
           </p:spPr>
@@ -2313,7 +2313,7 @@
             <a:effectLst/>
             <a:extLst>
               <a:ext uri="{C572A759-6A51-4108-AA02-DFA0A04FC94B}">
-                <ma14:wrappingTextBoxFlag xmlns="" xmlns:ma14="http://schemas.microsoft.com/office/mac/drawingml/2011/main" val="1"/>
+                <ma14:wrappingTextBoxFlag xmlns:ma14="http://schemas.microsoft.com/office/mac/drawingml/2011/main" xmlns="" val="1"/>
               </a:ext>
             </a:extLst>
           </p:spPr>
@@ -2384,7 +2384,7 @@
             <a:effectLst/>
             <a:extLst>
               <a:ext uri="{C572A759-6A51-4108-AA02-DFA0A04FC94B}">
-                <ma14:wrappingTextBoxFlag xmlns="" xmlns:ma14="http://schemas.microsoft.com/office/mac/drawingml/2011/main" val="1"/>
+                <ma14:wrappingTextBoxFlag xmlns:ma14="http://schemas.microsoft.com/office/mac/drawingml/2011/main" xmlns="" val="1"/>
               </a:ext>
             </a:extLst>
           </p:spPr>
@@ -2455,7 +2455,7 @@
             <a:effectLst/>
             <a:extLst>
               <a:ext uri="{C572A759-6A51-4108-AA02-DFA0A04FC94B}">
-                <ma14:wrappingTextBoxFlag xmlns="" xmlns:ma14="http://schemas.microsoft.com/office/mac/drawingml/2011/main" val="1"/>
+                <ma14:wrappingTextBoxFlag xmlns:ma14="http://schemas.microsoft.com/office/mac/drawingml/2011/main" xmlns="" val="1"/>
               </a:ext>
             </a:extLst>
           </p:spPr>
@@ -2515,7 +2515,7 @@
             <a:effectLst/>
             <a:extLst>
               <a:ext uri="{C572A759-6A51-4108-AA02-DFA0A04FC94B}">
-                <ma14:wrappingTextBoxFlag xmlns="" xmlns:ma14="http://schemas.microsoft.com/office/mac/drawingml/2011/main" val="1"/>
+                <ma14:wrappingTextBoxFlag xmlns:ma14="http://schemas.microsoft.com/office/mac/drawingml/2011/main" xmlns="" val="1"/>
               </a:ext>
             </a:extLst>
           </p:spPr>
@@ -2586,7 +2586,7 @@
             <a:effectLst/>
             <a:extLst>
               <a:ext uri="{C572A759-6A51-4108-AA02-DFA0A04FC94B}">
-                <ma14:wrappingTextBoxFlag xmlns="" xmlns:ma14="http://schemas.microsoft.com/office/mac/drawingml/2011/main" val="1"/>
+                <ma14:wrappingTextBoxFlag xmlns:ma14="http://schemas.microsoft.com/office/mac/drawingml/2011/main" xmlns="" val="1"/>
               </a:ext>
             </a:extLst>
           </p:spPr>
@@ -2657,7 +2657,7 @@
             <a:effectLst/>
             <a:extLst>
               <a:ext uri="{C572A759-6A51-4108-AA02-DFA0A04FC94B}">
-                <ma14:wrappingTextBoxFlag xmlns="" xmlns:ma14="http://schemas.microsoft.com/office/mac/drawingml/2011/main" val="1"/>
+                <ma14:wrappingTextBoxFlag xmlns:ma14="http://schemas.microsoft.com/office/mac/drawingml/2011/main" xmlns="" val="1"/>
               </a:ext>
             </a:extLst>
           </p:spPr>
@@ -2728,7 +2728,7 @@
             <a:effectLst/>
             <a:extLst>
               <a:ext uri="{C572A759-6A51-4108-AA02-DFA0A04FC94B}">
-                <ma14:wrappingTextBoxFlag xmlns="" xmlns:ma14="http://schemas.microsoft.com/office/mac/drawingml/2011/main" val="1"/>
+                <ma14:wrappingTextBoxFlag xmlns:ma14="http://schemas.microsoft.com/office/mac/drawingml/2011/main" xmlns="" val="1"/>
               </a:ext>
             </a:extLst>
           </p:spPr>
@@ -2799,7 +2799,7 @@
             <a:effectLst/>
             <a:extLst>
               <a:ext uri="{C572A759-6A51-4108-AA02-DFA0A04FC94B}">
-                <ma14:wrappingTextBoxFlag xmlns="" xmlns:ma14="http://schemas.microsoft.com/office/mac/drawingml/2011/main" val="1"/>
+                <ma14:wrappingTextBoxFlag xmlns:ma14="http://schemas.microsoft.com/office/mac/drawingml/2011/main" xmlns="" val="1"/>
               </a:ext>
             </a:extLst>
           </p:spPr>
@@ -2870,7 +2870,7 @@
             <a:effectLst/>
             <a:extLst>
               <a:ext uri="{C572A759-6A51-4108-AA02-DFA0A04FC94B}">
-                <ma14:wrappingTextBoxFlag xmlns="" xmlns:ma14="http://schemas.microsoft.com/office/mac/drawingml/2011/main" val="1"/>
+                <ma14:wrappingTextBoxFlag xmlns:ma14="http://schemas.microsoft.com/office/mac/drawingml/2011/main" xmlns="" val="1"/>
               </a:ext>
             </a:extLst>
           </p:spPr>
@@ -2948,7 +2948,7 @@
           <a:effectLst/>
           <a:extLst>
             <a:ext uri="{C572A759-6A51-4108-AA02-DFA0A04FC94B}">
-              <ma14:wrappingTextBoxFlag xmlns="" xmlns:ma14="http://schemas.microsoft.com/office/mac/drawingml/2011/main" val="1"/>
+              <ma14:wrappingTextBoxFlag xmlns:ma14="http://schemas.microsoft.com/office/mac/drawingml/2011/main" xmlns="" val="1"/>
             </a:ext>
           </a:extLst>
         </p:spPr>
@@ -3025,7 +3025,7 @@
           <a:effectLst/>
           <a:extLst>
             <a:ext uri="{C572A759-6A51-4108-AA02-DFA0A04FC94B}">
-              <ma14:wrappingTextBoxFlag xmlns="" xmlns:ma14="http://schemas.microsoft.com/office/mac/drawingml/2011/main" val="1"/>
+              <ma14:wrappingTextBoxFlag xmlns:ma14="http://schemas.microsoft.com/office/mac/drawingml/2011/main" xmlns="" val="1"/>
             </a:ext>
           </a:extLst>
         </p:spPr>
@@ -3746,6 +3746,36 @@
           <a:xfrm>
             <a:off x="9790248" y="3366326"/>
             <a:ext cx="9869352" cy="9819169"/>
+          </a:xfrm>
+          <a:prstGeom prst="rect">
+            <a:avLst/>
+          </a:prstGeom>
+        </p:spPr>
+      </p:pic>
+      <p:pic>
+        <p:nvPicPr>
+          <p:cNvPr id="3" name="Picture 2">
+            <a:extLst>
+              <a:ext uri="{FF2B5EF4-FFF2-40B4-BE49-F238E27FC236}">
+                <a16:creationId xmlns:a16="http://schemas.microsoft.com/office/drawing/2014/main" id="{BF9005A5-128B-43CE-A64C-ABFC2019CA7B}"/>
+              </a:ext>
+            </a:extLst>
+          </p:cNvPr>
+          <p:cNvPicPr>
+            <a:picLocks noChangeAspect="1"/>
+          </p:cNvPicPr>
+          <p:nvPr/>
+        </p:nvPicPr>
+        <p:blipFill>
+          <a:blip r:embed="rId4"/>
+          <a:stretch>
+            <a:fillRect/>
+          </a:stretch>
+        </p:blipFill>
+        <p:spPr>
+          <a:xfrm>
+            <a:off x="16991235" y="5476042"/>
+            <a:ext cx="7047467" cy="4193462"/>
           </a:xfrm>
           <a:prstGeom prst="rect">
             <a:avLst/>

</xml_diff>